<commit_message>
will be adding the master optimizatoin feature
</commit_message>
<xml_diff>
--- a/outcomes.pptx
+++ b/outcomes.pptx
@@ -5149,6 +5149,66 @@
           </a:prstGeom>
         </p:spPr>
       </p:pic>
+      <p:pic>
+        <p:nvPicPr>
+          <p:cNvPr id="8" name="Picture 7">
+            <a:extLst>
+              <a:ext uri="{FF2B5EF4-FFF2-40B4-BE49-F238E27FC236}">
+                <a16:creationId xmlns:a16="http://schemas.microsoft.com/office/drawing/2014/main" id="{AF794E0C-E352-C94D-9FB7-966B0556C01F}"/>
+              </a:ext>
+            </a:extLst>
+          </p:cNvPr>
+          <p:cNvPicPr>
+            <a:picLocks noChangeAspect="1"/>
+          </p:cNvPicPr>
+          <p:nvPr/>
+        </p:nvPicPr>
+        <p:blipFill>
+          <a:blip r:embed="rId4"/>
+          <a:stretch>
+            <a:fillRect/>
+          </a:stretch>
+        </p:blipFill>
+        <p:spPr>
+          <a:xfrm>
+            <a:off x="7094373" y="287940"/>
+            <a:ext cx="3521197" cy="2111049"/>
+          </a:xfrm>
+          <a:prstGeom prst="rect">
+            <a:avLst/>
+          </a:prstGeom>
+        </p:spPr>
+      </p:pic>
+      <p:pic>
+        <p:nvPicPr>
+          <p:cNvPr id="9" name="Picture 8">
+            <a:extLst>
+              <a:ext uri="{FF2B5EF4-FFF2-40B4-BE49-F238E27FC236}">
+                <a16:creationId xmlns:a16="http://schemas.microsoft.com/office/drawing/2014/main" id="{9F21E6E7-4AF5-4B4C-8B4A-73F0104E50A0}"/>
+              </a:ext>
+            </a:extLst>
+          </p:cNvPr>
+          <p:cNvPicPr>
+            <a:picLocks noChangeAspect="1"/>
+          </p:cNvPicPr>
+          <p:nvPr/>
+        </p:nvPicPr>
+        <p:blipFill>
+          <a:blip r:embed="rId5"/>
+          <a:stretch>
+            <a:fillRect/>
+          </a:stretch>
+        </p:blipFill>
+        <p:spPr>
+          <a:xfrm>
+            <a:off x="6463980" y="1999517"/>
+            <a:ext cx="4630215" cy="4677103"/>
+          </a:xfrm>
+          <a:prstGeom prst="rect">
+            <a:avLst/>
+          </a:prstGeom>
+        </p:spPr>
+      </p:pic>
     </p:spTree>
     <p:extLst>
       <p:ext uri="{BB962C8B-B14F-4D97-AF65-F5344CB8AC3E}">
@@ -5179,6 +5239,126 @@
           <a:chExt cx="0" cy="0"/>
         </a:xfrm>
       </p:grpSpPr>
+      <p:pic>
+        <p:nvPicPr>
+          <p:cNvPr id="2" name="Picture 1">
+            <a:extLst>
+              <a:ext uri="{FF2B5EF4-FFF2-40B4-BE49-F238E27FC236}">
+                <a16:creationId xmlns:a16="http://schemas.microsoft.com/office/drawing/2014/main" id="{AC8E84C7-214E-8E43-A121-DE687A38814C}"/>
+              </a:ext>
+            </a:extLst>
+          </p:cNvPr>
+          <p:cNvPicPr>
+            <a:picLocks noChangeAspect="1"/>
+          </p:cNvPicPr>
+          <p:nvPr/>
+        </p:nvPicPr>
+        <p:blipFill>
+          <a:blip r:embed="rId2"/>
+          <a:stretch>
+            <a:fillRect/>
+          </a:stretch>
+        </p:blipFill>
+        <p:spPr>
+          <a:xfrm>
+            <a:off x="241737" y="1837920"/>
+            <a:ext cx="5007403" cy="5020080"/>
+          </a:xfrm>
+          <a:prstGeom prst="rect">
+            <a:avLst/>
+          </a:prstGeom>
+        </p:spPr>
+      </p:pic>
+      <p:pic>
+        <p:nvPicPr>
+          <p:cNvPr id="3" name="Picture 2">
+            <a:extLst>
+              <a:ext uri="{FF2B5EF4-FFF2-40B4-BE49-F238E27FC236}">
+                <a16:creationId xmlns:a16="http://schemas.microsoft.com/office/drawing/2014/main" id="{7B3E0ABA-CD14-0F45-A2AC-5226160745F7}"/>
+              </a:ext>
+            </a:extLst>
+          </p:cNvPr>
+          <p:cNvPicPr>
+            <a:picLocks noChangeAspect="1"/>
+          </p:cNvPicPr>
+          <p:nvPr/>
+        </p:nvPicPr>
+        <p:blipFill>
+          <a:blip r:embed="rId3"/>
+          <a:stretch>
+            <a:fillRect/>
+          </a:stretch>
+        </p:blipFill>
+        <p:spPr>
+          <a:xfrm>
+            <a:off x="351706" y="158092"/>
+            <a:ext cx="4787463" cy="1930943"/>
+          </a:xfrm>
+          <a:prstGeom prst="rect">
+            <a:avLst/>
+          </a:prstGeom>
+        </p:spPr>
+      </p:pic>
+      <p:pic>
+        <p:nvPicPr>
+          <p:cNvPr id="4" name="Picture 3">
+            <a:extLst>
+              <a:ext uri="{FF2B5EF4-FFF2-40B4-BE49-F238E27FC236}">
+                <a16:creationId xmlns:a16="http://schemas.microsoft.com/office/drawing/2014/main" id="{322CC8DF-AE93-7545-BBA8-6BF5456B1FC0}"/>
+              </a:ext>
+            </a:extLst>
+          </p:cNvPr>
+          <p:cNvPicPr>
+            <a:picLocks noChangeAspect="1"/>
+          </p:cNvPicPr>
+          <p:nvPr/>
+        </p:nvPicPr>
+        <p:blipFill>
+          <a:blip r:embed="rId4"/>
+          <a:stretch>
+            <a:fillRect/>
+          </a:stretch>
+        </p:blipFill>
+        <p:spPr>
+          <a:xfrm>
+            <a:off x="6096000" y="2089035"/>
+            <a:ext cx="4477605" cy="4494566"/>
+          </a:xfrm>
+          <a:prstGeom prst="rect">
+            <a:avLst/>
+          </a:prstGeom>
+        </p:spPr>
+      </p:pic>
+      <p:pic>
+        <p:nvPicPr>
+          <p:cNvPr id="5" name="Picture 4">
+            <a:extLst>
+              <a:ext uri="{FF2B5EF4-FFF2-40B4-BE49-F238E27FC236}">
+                <a16:creationId xmlns:a16="http://schemas.microsoft.com/office/drawing/2014/main" id="{5B1B447E-4E91-F84B-A8C3-547AB5C375E1}"/>
+              </a:ext>
+            </a:extLst>
+          </p:cNvPr>
+          <p:cNvPicPr>
+            <a:picLocks noChangeAspect="1"/>
+          </p:cNvPicPr>
+          <p:nvPr/>
+        </p:nvPicPr>
+        <p:blipFill>
+          <a:blip r:embed="rId5"/>
+          <a:stretch>
+            <a:fillRect/>
+          </a:stretch>
+        </p:blipFill>
+        <p:spPr>
+          <a:xfrm>
+            <a:off x="5424312" y="158092"/>
+            <a:ext cx="5820979" cy="2311813"/>
+          </a:xfrm>
+          <a:prstGeom prst="rect">
+            <a:avLst/>
+          </a:prstGeom>
+        </p:spPr>
+      </p:pic>
     </p:spTree>
     <p:extLst>
       <p:ext uri="{BB962C8B-B14F-4D97-AF65-F5344CB8AC3E}">
@@ -5209,6 +5389,66 @@
           <a:chExt cx="0" cy="0"/>
         </a:xfrm>
       </p:grpSpPr>
+      <p:pic>
+        <p:nvPicPr>
+          <p:cNvPr id="2" name="Picture 1">
+            <a:extLst>
+              <a:ext uri="{FF2B5EF4-FFF2-40B4-BE49-F238E27FC236}">
+                <a16:creationId xmlns:a16="http://schemas.microsoft.com/office/drawing/2014/main" id="{9AAEA985-DFF8-AC49-9DB0-772DD69FEF2A}"/>
+              </a:ext>
+            </a:extLst>
+          </p:cNvPr>
+          <p:cNvPicPr>
+            <a:picLocks noChangeAspect="1"/>
+          </p:cNvPicPr>
+          <p:nvPr/>
+        </p:nvPicPr>
+        <p:blipFill>
+          <a:blip r:embed="rId2"/>
+          <a:stretch>
+            <a:fillRect/>
+          </a:stretch>
+        </p:blipFill>
+        <p:spPr>
+          <a:xfrm>
+            <a:off x="73572" y="1734207"/>
+            <a:ext cx="4755220" cy="4767168"/>
+          </a:xfrm>
+          <a:prstGeom prst="rect">
+            <a:avLst/>
+          </a:prstGeom>
+        </p:spPr>
+      </p:pic>
+      <p:pic>
+        <p:nvPicPr>
+          <p:cNvPr id="3" name="Picture 2">
+            <a:extLst>
+              <a:ext uri="{FF2B5EF4-FFF2-40B4-BE49-F238E27FC236}">
+                <a16:creationId xmlns:a16="http://schemas.microsoft.com/office/drawing/2014/main" id="{B3F17728-F297-FD4C-A834-A731B9CAB26F}"/>
+              </a:ext>
+            </a:extLst>
+          </p:cNvPr>
+          <p:cNvPicPr>
+            <a:picLocks noChangeAspect="1"/>
+          </p:cNvPicPr>
+          <p:nvPr/>
+        </p:nvPicPr>
+        <p:blipFill>
+          <a:blip r:embed="rId3"/>
+          <a:stretch>
+            <a:fillRect/>
+          </a:stretch>
+        </p:blipFill>
+        <p:spPr>
+          <a:xfrm>
+            <a:off x="483475" y="239548"/>
+            <a:ext cx="4590393" cy="1905163"/>
+          </a:xfrm>
+          <a:prstGeom prst="rect">
+            <a:avLst/>
+          </a:prstGeom>
+        </p:spPr>
+      </p:pic>
     </p:spTree>
     <p:extLst>
       <p:ext uri="{BB962C8B-B14F-4D97-AF65-F5344CB8AC3E}">

</xml_diff>